<commit_message>
Update slides with more notes
</commit_message>
<xml_diff>
--- a/Pursuing a Passion Project- Struggles and Successes.pptx
+++ b/Pursuing a Passion Project- Struggles and Successes.pptx
@@ -328,8 +328,8 @@
         </p:nvSpPr>
         <p:spPr>
           <a:xfrm>
-            <a:off x="381175" y="685800"/>
-            <a:ext cx="6096300" cy="3429000"/>
+            <a:off x="381000" y="685800"/>
+            <a:ext cx="6096000" cy="3429000"/>
           </a:xfrm>
           <a:custGeom>
             <a:avLst/>
@@ -934,6 +934,10 @@
               </a:spcBef>
               <a:buNone/>
             </a:pPr>
+            <a:r>
+              <a:rPr lang="en-US" dirty="0" smtClean="0"/>
+              <a:t>I bought a cheap backdrop…</a:t>
+            </a:r>
             <a:endParaRPr dirty="0"/>
           </a:p>
         </p:txBody>
@@ -1040,6 +1044,14 @@
               </a:spcBef>
               <a:buNone/>
             </a:pPr>
+            <a:r>
+              <a:rPr lang="en-US" dirty="0" smtClean="0"/>
+              <a:t>… and a tripod</a:t>
+            </a:r>
+            <a:r>
+              <a:rPr lang="en-US" baseline="0" dirty="0" smtClean="0"/>
+              <a:t> frame to hang it up from…</a:t>
+            </a:r>
             <a:endParaRPr dirty="0"/>
           </a:p>
         </p:txBody>
@@ -1146,6 +1158,18 @@
               </a:spcBef>
               <a:buNone/>
             </a:pPr>
+            <a:r>
+              <a:rPr lang="en-US" dirty="0" smtClean="0"/>
+              <a:t>… and some clips to hang it on…  and for</a:t>
+            </a:r>
+            <a:r>
+              <a:rPr lang="en-US" baseline="0" dirty="0" smtClean="0"/>
+              <a:t> considerably under $100 I drastically improved the professional look of </a:t>
+            </a:r>
+            <a:r>
+              <a:rPr lang="en-US" baseline="0" smtClean="0"/>
+              <a:t>my show.</a:t>
+            </a:r>
             <a:endParaRPr dirty="0"/>
           </a:p>
         </p:txBody>
@@ -4055,11 +4079,7 @@
             </a:pPr>
             <a:r>
               <a:rPr lang="en-US" dirty="0" smtClean="0"/>
-              <a:t>a</a:t>
-            </a:r>
-            <a:r>
-              <a:rPr lang="en-US" dirty="0" smtClean="0"/>
-              <a:t>.	I knew it would be a lot of work, especially from my background in video and audio work</a:t>
+              <a:t>a.	I knew it would be a lot of work, especially from my background in video and audio work</a:t>
             </a:r>
           </a:p>
           <a:p>
@@ -9266,15 +9286,7 @@
                   <a:srgbClr val="FFFFFF"/>
                 </a:solidFill>
               </a:rPr>
-              <a:t>Us </a:t>
-            </a:r>
-            <a:r>
-              <a:rPr lang="en-US" sz="2400" dirty="0" smtClean="0">
-                <a:solidFill>
-                  <a:srgbClr val="FFFFFF"/>
-                </a:solidFill>
-              </a:rPr>
-              <a:t>on Twitter!</a:t>
+              <a:t>Us on Twitter!</a:t>
             </a:r>
             <a:endParaRPr lang="en" sz="2400" dirty="0">
               <a:solidFill>
@@ -9634,17 +9646,7 @@
                   </a:schemeClr>
                 </a:solidFill>
               </a:rPr>
-              <a:t>Us </a:t>
-            </a:r>
-            <a:r>
-              <a:rPr lang="en-US" sz="2400" dirty="0" smtClean="0">
-                <a:solidFill>
-                  <a:schemeClr val="bg1">
-                    <a:lumMod val="65000"/>
-                  </a:schemeClr>
-                </a:solidFill>
-              </a:rPr>
-              <a:t>on Twitter!</a:t>
+              <a:t>Us on Twitter!</a:t>
             </a:r>
             <a:endParaRPr lang="en" sz="2400" dirty="0">
               <a:solidFill>

</xml_diff>